<commit_message>
Added first draft of the GanttProject
</commit_message>
<xml_diff>
--- a/CS108-FS17-meilenstein1-Wasserschlacht.pptx
+++ b/CS108-FS17-meilenstein1-Wasserschlacht.pptx
@@ -3850,11 +3850,7 @@
             </a:r>
             <a:r>
               <a:rPr lang="de-CH" smtClean="0"/>
-              <a:t>Gruppe </a:t>
-            </a:r>
-            <a:r>
-              <a:rPr lang="de-CH" smtClean="0"/>
-              <a:t>4</a:t>
+              <a:t>Gruppe 4</a:t>
             </a:r>
             <a:r>
               <a:rPr lang="de-CH" dirty="0" smtClean="0"/>
@@ -6250,30 +6246,19 @@
           <a:bodyPr/>
           <a:lstStyle/>
           <a:p>
-            <a:pPr marL="266700" lvl="1" indent="-266700" fontAlgn="base">
-              <a:spcBef>
-                <a:spcPts val="600"/>
-              </a:spcBef>
-              <a:spcAft>
-                <a:spcPct val="0"/>
-              </a:spcAft>
-              <a:buFont typeface="Arial" pitchFamily="34" charset="0"/>
-              <a:buChar char="•"/>
-            </a:pPr>
-            <a:r>
-              <a:rPr lang="de-CH" i="1" dirty="0" smtClean="0"/>
-              <a:t>Wie werden die Aktivitäten/Entscheidungen dokumentiert </a:t>
-            </a:r>
-            <a:br>
-              <a:rPr lang="de-CH" i="1" dirty="0" smtClean="0"/>
-            </a:br>
-            <a:r>
-              <a:rPr lang="de-CH" i="1" dirty="0" smtClean="0"/>
-              <a:t>(Blog, Textdokument, etc.)?</a:t>
-            </a:r>
-          </a:p>
-          <a:p>
-            <a:endParaRPr lang="en-US" dirty="0"/>
+            <a:r>
+              <a:rPr lang="en-US" dirty="0" err="1" smtClean="0"/>
+              <a:t>Projekttagebuch</a:t>
+            </a:r>
+            <a:r>
+              <a:rPr lang="en-US" dirty="0"/>
+              <a:t> auf </a:t>
+            </a:r>
+            <a:r>
+              <a:rPr lang="en-US" b="1" dirty="0" err="1" smtClean="0"/>
+              <a:t>wasserschlachtsimulator.blogspot.ch</a:t>
+            </a:r>
+            <a:endParaRPr lang="en-US" b="1" dirty="0"/>
           </a:p>
         </p:txBody>
       </p:sp>

</xml_diff>